<commit_message>
Added timetable and modified ppt
</commit_message>
<xml_diff>
--- a/Meetup(06-July).pptx
+++ b/Meetup(06-July).pptx
@@ -621,7 +621,7 @@
           <a:p>
             <a:fld id="{CDEE99D9-A063-4F2F-B676-A38BAD0CEC16}" type="datetimeFigureOut">
               <a:rPr lang="en-US" smtClean="0"/>
-              <a:t>7/2/2019</a:t>
+              <a:t>7/3/2019</a:t>
             </a:fld>
             <a:endParaRPr lang="en-US"/>
           </a:p>
@@ -917,7 +917,7 @@
           <a:p>
             <a:fld id="{CDEE99D9-A063-4F2F-B676-A38BAD0CEC16}" type="datetimeFigureOut">
               <a:rPr lang="en-US" smtClean="0"/>
-              <a:t>7/2/2019</a:t>
+              <a:t>7/3/2019</a:t>
             </a:fld>
             <a:endParaRPr lang="en-US"/>
           </a:p>
@@ -1165,7 +1165,7 @@
           <a:p>
             <a:fld id="{CDEE99D9-A063-4F2F-B676-A38BAD0CEC16}" type="datetimeFigureOut">
               <a:rPr lang="en-US" smtClean="0"/>
-              <a:t>7/2/2019</a:t>
+              <a:t>7/3/2019</a:t>
             </a:fld>
             <a:endParaRPr lang="en-US"/>
           </a:p>
@@ -1705,7 +1705,7 @@
           <a:p>
             <a:fld id="{CDEE99D9-A063-4F2F-B676-A38BAD0CEC16}" type="datetimeFigureOut">
               <a:rPr lang="en-US" smtClean="0"/>
-              <a:t>7/2/2019</a:t>
+              <a:t>7/3/2019</a:t>
             </a:fld>
             <a:endParaRPr lang="en-US"/>
           </a:p>
@@ -1953,7 +1953,7 @@
           <a:p>
             <a:fld id="{CDEE99D9-A063-4F2F-B676-A38BAD0CEC16}" type="datetimeFigureOut">
               <a:rPr lang="en-US" smtClean="0"/>
-              <a:t>7/2/2019</a:t>
+              <a:t>7/3/2019</a:t>
             </a:fld>
             <a:endParaRPr lang="en-US"/>
           </a:p>
@@ -2485,7 +2485,7 @@
           <a:p>
             <a:fld id="{CDEE99D9-A063-4F2F-B676-A38BAD0CEC16}" type="datetimeFigureOut">
               <a:rPr lang="en-US" smtClean="0"/>
-              <a:t>7/2/2019</a:t>
+              <a:t>7/3/2019</a:t>
             </a:fld>
             <a:endParaRPr lang="en-US"/>
           </a:p>
@@ -2782,7 +2782,7 @@
           <a:p>
             <a:fld id="{CDEE99D9-A063-4F2F-B676-A38BAD0CEC16}" type="datetimeFigureOut">
               <a:rPr lang="en-US" smtClean="0"/>
-              <a:t>7/2/2019</a:t>
+              <a:t>7/3/2019</a:t>
             </a:fld>
             <a:endParaRPr lang="en-US"/>
           </a:p>
@@ -2956,7 +2956,7 @@
           <a:p>
             <a:fld id="{CDEE99D9-A063-4F2F-B676-A38BAD0CEC16}" type="datetimeFigureOut">
               <a:rPr lang="en-US" smtClean="0"/>
-              <a:t>7/2/2019</a:t>
+              <a:t>7/3/2019</a:t>
             </a:fld>
             <a:endParaRPr lang="en-US"/>
           </a:p>
@@ -3136,7 +3136,7 @@
           <a:p>
             <a:fld id="{CDEE99D9-A063-4F2F-B676-A38BAD0CEC16}" type="datetimeFigureOut">
               <a:rPr lang="en-US" smtClean="0"/>
-              <a:t>7/2/2019</a:t>
+              <a:t>7/3/2019</a:t>
             </a:fld>
             <a:endParaRPr lang="en-US"/>
           </a:p>
@@ -3306,7 +3306,7 @@
           <a:p>
             <a:fld id="{CDEE99D9-A063-4F2F-B676-A38BAD0CEC16}" type="datetimeFigureOut">
               <a:rPr lang="en-US" smtClean="0"/>
-              <a:t>7/2/2019</a:t>
+              <a:t>7/3/2019</a:t>
             </a:fld>
             <a:endParaRPr lang="en-US"/>
           </a:p>
@@ -3557,7 +3557,7 @@
           <a:p>
             <a:fld id="{CDEE99D9-A063-4F2F-B676-A38BAD0CEC16}" type="datetimeFigureOut">
               <a:rPr lang="en-US" smtClean="0"/>
-              <a:t>7/2/2019</a:t>
+              <a:t>7/3/2019</a:t>
             </a:fld>
             <a:endParaRPr lang="en-US"/>
           </a:p>
@@ -3854,7 +3854,7 @@
           <a:p>
             <a:fld id="{CDEE99D9-A063-4F2F-B676-A38BAD0CEC16}" type="datetimeFigureOut">
               <a:rPr lang="en-US" smtClean="0"/>
-              <a:t>7/2/2019</a:t>
+              <a:t>7/3/2019</a:t>
             </a:fld>
             <a:endParaRPr lang="en-US"/>
           </a:p>
@@ -4296,7 +4296,7 @@
           <a:p>
             <a:fld id="{CDEE99D9-A063-4F2F-B676-A38BAD0CEC16}" type="datetimeFigureOut">
               <a:rPr lang="en-US" smtClean="0"/>
-              <a:t>7/2/2019</a:t>
+              <a:t>7/3/2019</a:t>
             </a:fld>
             <a:endParaRPr lang="en-US"/>
           </a:p>
@@ -4414,7 +4414,7 @@
           <a:p>
             <a:fld id="{CDEE99D9-A063-4F2F-B676-A38BAD0CEC16}" type="datetimeFigureOut">
               <a:rPr lang="en-US" smtClean="0"/>
-              <a:t>7/2/2019</a:t>
+              <a:t>7/3/2019</a:t>
             </a:fld>
             <a:endParaRPr lang="en-US"/>
           </a:p>
@@ -4509,7 +4509,7 @@
           <a:p>
             <a:fld id="{CDEE99D9-A063-4F2F-B676-A38BAD0CEC16}" type="datetimeFigureOut">
               <a:rPr lang="en-US" smtClean="0"/>
-              <a:t>7/2/2019</a:t>
+              <a:t>7/3/2019</a:t>
             </a:fld>
             <a:endParaRPr lang="en-US"/>
           </a:p>
@@ -4792,7 +4792,7 @@
           <a:p>
             <a:fld id="{CDEE99D9-A063-4F2F-B676-A38BAD0CEC16}" type="datetimeFigureOut">
               <a:rPr lang="en-US" smtClean="0"/>
-              <a:t>7/2/2019</a:t>
+              <a:t>7/3/2019</a:t>
             </a:fld>
             <a:endParaRPr lang="en-US"/>
           </a:p>
@@ -5083,7 +5083,7 @@
           <a:p>
             <a:fld id="{CDEE99D9-A063-4F2F-B676-A38BAD0CEC16}" type="datetimeFigureOut">
               <a:rPr lang="en-US" smtClean="0"/>
-              <a:t>7/2/2019</a:t>
+              <a:t>7/3/2019</a:t>
             </a:fld>
             <a:endParaRPr lang="en-US"/>
           </a:p>
@@ -5613,7 +5613,7 @@
           <a:p>
             <a:fld id="{CDEE99D9-A063-4F2F-B676-A38BAD0CEC16}" type="datetimeFigureOut">
               <a:rPr lang="en-US" smtClean="0"/>
-              <a:t>7/2/2019</a:t>
+              <a:t>7/3/2019</a:t>
             </a:fld>
             <a:endParaRPr lang="en-US"/>
           </a:p>
@@ -6332,7 +6332,12 @@
             <p:ph type="title"/>
           </p:nvPr>
         </p:nvSpPr>
-        <p:spPr/>
+        <p:spPr>
+          <a:xfrm>
+            <a:off x="1484310" y="201169"/>
+            <a:ext cx="10018713" cy="923543"/>
+          </a:xfrm>
+        </p:spPr>
         <p:txBody>
           <a:bodyPr/>
           <a:lstStyle/>
@@ -6355,152 +6360,286 @@
             <p:ph idx="1"/>
           </p:nvPr>
         </p:nvSpPr>
-        <p:spPr/>
+        <p:spPr>
+          <a:xfrm>
+            <a:off x="1484310" y="1371600"/>
+            <a:ext cx="10018713" cy="4946904"/>
+          </a:xfrm>
+        </p:spPr>
         <p:txBody>
           <a:bodyPr>
-            <a:normAutofit fontScale="92500" lnSpcReduction="20000"/>
+            <a:normAutofit fontScale="40000" lnSpcReduction="20000"/>
           </a:bodyPr>
           <a:lstStyle/>
           <a:p>
-            <a:r>
-              <a:rPr lang="en-US" dirty="0" smtClean="0"/>
+            <a:pPr marL="0" indent="0">
+              <a:buNone/>
+            </a:pPr>
+            <a:r>
+              <a:rPr lang="en-US" sz="3800" b="1" dirty="0" smtClean="0"/>
+              <a:t>Background Knowledge - </a:t>
+            </a:r>
+            <a:endParaRPr lang="en-US" sz="3800" dirty="0"/>
+          </a:p>
+          <a:p>
+            <a:r>
+              <a:rPr lang="en-US" sz="3800" dirty="0"/>
+              <a:t>Experience using the terminal or command prompts </a:t>
+            </a:r>
+          </a:p>
+          <a:p>
+            <a:r>
+              <a:rPr lang="en-US" sz="3800" dirty="0" smtClean="0"/>
+              <a:t>Basics </a:t>
+            </a:r>
+            <a:r>
+              <a:rPr lang="en-US" sz="3800" dirty="0"/>
+              <a:t>of Linux (e.g., shells, SSH, and package managers) </a:t>
+            </a:r>
+          </a:p>
+          <a:p>
+            <a:r>
+              <a:rPr lang="en-US" sz="3800" dirty="0"/>
+              <a:t>A basic understanding of web and database </a:t>
+            </a:r>
+            <a:r>
+              <a:rPr lang="en-US" sz="3800" dirty="0" smtClean="0"/>
+              <a:t>servers, </a:t>
+            </a:r>
+            <a:r>
+              <a:rPr lang="en-US" sz="3800" dirty="0"/>
+              <a:t>IPs, and ports </a:t>
+            </a:r>
+            <a:endParaRPr lang="en-US" sz="3800" dirty="0" smtClean="0"/>
+          </a:p>
+          <a:p>
+            <a:pPr marL="0" indent="0">
+              <a:buNone/>
+            </a:pPr>
+            <a:r>
+              <a:rPr lang="en-US" sz="3800" b="1" dirty="0" smtClean="0"/>
+              <a:t>Hardware and Installation</a:t>
+            </a:r>
+            <a:r>
+              <a:rPr lang="en-US" sz="3800" dirty="0" smtClean="0"/>
+              <a:t> - </a:t>
+            </a:r>
+          </a:p>
+          <a:p>
+            <a:r>
+              <a:rPr lang="en-US" sz="3800" dirty="0" smtClean="0"/>
               <a:t>Terraform </a:t>
             </a:r>
             <a:r>
-              <a:rPr lang="en-US" dirty="0"/>
+              <a:rPr lang="en-US" sz="3800" dirty="0"/>
               <a:t>- </a:t>
             </a:r>
             <a:r>
-              <a:rPr lang="en-US" dirty="0">
+              <a:rPr lang="en-US" sz="3800" dirty="0">
                 <a:hlinkClick r:id="rId2"/>
               </a:rPr>
               <a:t>https://</a:t>
             </a:r>
             <a:r>
-              <a:rPr lang="en-US" dirty="0" smtClean="0">
+              <a:rPr lang="en-US" sz="3800" dirty="0" smtClean="0">
                 <a:hlinkClick r:id="rId2"/>
               </a:rPr>
               <a:t>www.terraform.io/downloads.html</a:t>
             </a:r>
-            <a:endParaRPr lang="en-US" dirty="0"/>
-          </a:p>
-          <a:p>
-            <a:r>
-              <a:rPr lang="en-US" dirty="0" smtClean="0"/>
+            <a:endParaRPr lang="en-US" sz="3800" dirty="0"/>
+          </a:p>
+          <a:p>
+            <a:r>
+              <a:rPr lang="en-US" sz="3800" dirty="0" smtClean="0"/>
               <a:t>Visual </a:t>
             </a:r>
             <a:r>
-              <a:rPr lang="en-US" dirty="0"/>
+              <a:rPr lang="en-US" sz="3800" dirty="0"/>
               <a:t>Studio Code - </a:t>
             </a:r>
             <a:r>
-              <a:rPr lang="en-US" dirty="0">
+              <a:rPr lang="en-US" sz="3800" dirty="0">
                 <a:hlinkClick r:id="rId3"/>
               </a:rPr>
               <a:t>https://</a:t>
             </a:r>
             <a:r>
-              <a:rPr lang="en-US" dirty="0" smtClean="0">
+              <a:rPr lang="en-US" sz="3800" dirty="0" smtClean="0">
                 <a:hlinkClick r:id="rId3"/>
               </a:rPr>
               <a:t>code.visualstudio.com/download</a:t>
             </a:r>
-            <a:endParaRPr lang="en-US" dirty="0"/>
-          </a:p>
-          <a:p>
-            <a:r>
-              <a:rPr lang="en-US" dirty="0" smtClean="0"/>
+            <a:endParaRPr lang="en-US" sz="3800" dirty="0"/>
+          </a:p>
+          <a:p>
+            <a:r>
+              <a:rPr lang="en-US" sz="3800" dirty="0" smtClean="0"/>
               <a:t>Extensions </a:t>
             </a:r>
             <a:r>
-              <a:rPr lang="en-US" dirty="0"/>
+              <a:rPr lang="en-US" sz="3800" dirty="0"/>
               <a:t>related to terraform - </a:t>
             </a:r>
             <a:r>
-              <a:rPr lang="en-US" dirty="0">
+              <a:rPr lang="en-US" sz="3800" dirty="0">
                 <a:hlinkClick r:id="rId4"/>
               </a:rPr>
               <a:t>https://</a:t>
             </a:r>
             <a:r>
-              <a:rPr lang="en-US" dirty="0" smtClean="0">
+              <a:rPr lang="en-US" sz="3800" dirty="0" smtClean="0">
                 <a:hlinkClick r:id="rId4"/>
               </a:rPr>
               <a:t>marketplace.visualstudio.com/items?itemName=mauve.terraform</a:t>
             </a:r>
-            <a:endParaRPr lang="en-US" dirty="0"/>
-          </a:p>
-          <a:p>
-            <a:r>
-              <a:rPr lang="en-US" dirty="0" smtClean="0"/>
+            <a:endParaRPr lang="en-US" sz="3800" dirty="0"/>
+          </a:p>
+          <a:p>
+            <a:r>
+              <a:rPr lang="en-US" sz="3800" dirty="0" smtClean="0"/>
               <a:t>Docker </a:t>
             </a:r>
             <a:r>
-              <a:rPr lang="en-US" dirty="0"/>
+              <a:rPr lang="en-US" sz="3800" dirty="0"/>
               <a:t>run time - </a:t>
             </a:r>
             <a:r>
-              <a:rPr lang="en-US" dirty="0">
+              <a:rPr lang="en-US" sz="3800" dirty="0">
                 <a:hlinkClick r:id="rId5"/>
               </a:rPr>
               <a:t>https://docs.docker.com/install/linux/docker-ce/ubuntu</a:t>
             </a:r>
             <a:r>
-              <a:rPr lang="en-US" dirty="0" smtClean="0">
+              <a:rPr lang="en-US" sz="3800" dirty="0" smtClean="0">
                 <a:hlinkClick r:id="rId5"/>
               </a:rPr>
               <a:t>/</a:t>
             </a:r>
-            <a:endParaRPr lang="en-US" dirty="0"/>
-          </a:p>
-          <a:p>
-            <a:r>
-              <a:rPr lang="en-US" dirty="0" err="1" smtClean="0"/>
+            <a:endParaRPr lang="en-US" sz="3800" dirty="0"/>
+          </a:p>
+          <a:p>
+            <a:r>
+              <a:rPr lang="en-US" sz="3800" dirty="0" err="1" smtClean="0"/>
               <a:t>Kubectl</a:t>
             </a:r>
             <a:r>
-              <a:rPr lang="en-US" dirty="0" smtClean="0"/>
+              <a:rPr lang="en-US" sz="3800" dirty="0" smtClean="0"/>
               <a:t> </a:t>
             </a:r>
             <a:r>
-              <a:rPr lang="en-US" dirty="0"/>
+              <a:rPr lang="en-US" sz="3800" dirty="0"/>
               <a:t>tool - </a:t>
             </a:r>
             <a:r>
-              <a:rPr lang="en-US" dirty="0">
+              <a:rPr lang="en-US" sz="3800" dirty="0">
                 <a:hlinkClick r:id="rId6"/>
               </a:rPr>
               <a:t>https://kubernetes.io/docs/tasks/tools/install-kubectl</a:t>
             </a:r>
             <a:r>
-              <a:rPr lang="en-US" dirty="0" smtClean="0">
+              <a:rPr lang="en-US" sz="3800" dirty="0" smtClean="0">
                 <a:hlinkClick r:id="rId6"/>
               </a:rPr>
               <a:t>/</a:t>
             </a:r>
-            <a:endParaRPr lang="en-US" dirty="0"/>
-          </a:p>
-          <a:p>
-            <a:r>
-              <a:rPr lang="en-US" dirty="0" smtClean="0"/>
+            <a:endParaRPr lang="en-US" sz="3800" dirty="0"/>
+          </a:p>
+          <a:p>
+            <a:r>
+              <a:rPr lang="en-US" sz="3800" dirty="0" smtClean="0"/>
               <a:t>Azure </a:t>
             </a:r>
             <a:r>
-              <a:rPr lang="en-US" dirty="0"/>
+              <a:rPr lang="en-US" sz="3800" dirty="0"/>
               <a:t>Account </a:t>
             </a:r>
             <a:r>
-              <a:rPr lang="en-US" dirty="0">
+              <a:rPr lang="en-US" sz="3800" dirty="0">
                 <a:hlinkClick r:id="rId7"/>
               </a:rPr>
               <a:t>https://</a:t>
             </a:r>
             <a:r>
-              <a:rPr lang="en-US" dirty="0" smtClean="0">
+              <a:rPr lang="en-US" sz="3800" dirty="0" smtClean="0">
                 <a:hlinkClick r:id="rId7"/>
               </a:rPr>
               <a:t>marketplace.visualstudio.com/items?itemName=ms-vscode.azure-account</a:t>
             </a:r>
+            <a:endParaRPr lang="en-US" sz="3800" dirty="0" smtClean="0"/>
+          </a:p>
+          <a:p>
+            <a:endParaRPr lang="en-US" sz="3800" dirty="0" smtClean="0"/>
+          </a:p>
+          <a:p>
+            <a:pPr marL="0" indent="0">
+              <a:buNone/>
+            </a:pPr>
+            <a:r>
+              <a:rPr lang="en-US" sz="3800" b="1" dirty="0" smtClean="0"/>
+              <a:t>Note</a:t>
+            </a:r>
+            <a:r>
+              <a:rPr lang="en-US" sz="3800" dirty="0" smtClean="0"/>
+              <a:t> </a:t>
+            </a:r>
+            <a:r>
+              <a:rPr lang="en-US" sz="3800" dirty="0"/>
+              <a:t>- Be kind to the </a:t>
+            </a:r>
+            <a:r>
+              <a:rPr lang="en-US" sz="3800" dirty="0" err="1"/>
+              <a:t>WiFi</a:t>
+            </a:r>
+            <a:r>
+              <a:rPr lang="en-US" sz="3800" dirty="0"/>
+              <a:t>!</a:t>
+            </a:r>
+          </a:p>
+          <a:p>
+            <a:pPr>
+              <a:buFont typeface="Wingdings" panose="05000000000000000000" pitchFamily="2" charset="2"/>
+              <a:buChar char="Ø"/>
+            </a:pPr>
+            <a:r>
+              <a:rPr lang="en-US" sz="3800" dirty="0"/>
+              <a:t>Don't use your </a:t>
+            </a:r>
+            <a:r>
+              <a:rPr lang="en-US" sz="3800" dirty="0" smtClean="0"/>
+              <a:t>hotspot</a:t>
+            </a:r>
+            <a:endParaRPr lang="en-US" sz="3800" dirty="0"/>
+          </a:p>
+          <a:p>
+            <a:pPr>
+              <a:buFont typeface="Wingdings" panose="05000000000000000000" pitchFamily="2" charset="2"/>
+              <a:buChar char="Ø"/>
+            </a:pPr>
+            <a:r>
+              <a:rPr lang="en-US" sz="3800" dirty="0"/>
+              <a:t>Don't stream videos or download big files during the </a:t>
+            </a:r>
+            <a:r>
+              <a:rPr lang="en-US" sz="3800" dirty="0" smtClean="0"/>
+              <a:t>workshop</a:t>
+            </a:r>
+            <a:endParaRPr lang="en-US" sz="3800" dirty="0"/>
+          </a:p>
+          <a:p>
+            <a:pPr marL="0" indent="0">
+              <a:buNone/>
+            </a:pPr>
+            <a:r>
+              <a:rPr lang="en-US" sz="3800" dirty="0" smtClean="0"/>
+              <a:t>									Thank </a:t>
+            </a:r>
+            <a:r>
+              <a:rPr lang="en-US" sz="3800" dirty="0"/>
+              <a:t>you!</a:t>
+            </a:r>
+            <a:endParaRPr lang="en-US" sz="3800" dirty="0" smtClean="0"/>
+          </a:p>
+          <a:p>
             <a:endParaRPr lang="en-US" dirty="0" smtClean="0"/>
           </a:p>
         </p:txBody>
@@ -6552,12 +6691,7 @@
             <p:ph type="title"/>
           </p:nvPr>
         </p:nvSpPr>
-        <p:spPr>
-          <a:xfrm>
-            <a:off x="1392871" y="1"/>
-            <a:ext cx="10018713" cy="1417320"/>
-          </a:xfrm>
-        </p:spPr>
+        <p:spPr/>
         <p:txBody>
           <a:bodyPr/>
           <a:lstStyle/>
@@ -6580,15 +6714,10 @@
             <p:ph idx="1"/>
           </p:nvPr>
         </p:nvSpPr>
-        <p:spPr>
-          <a:xfrm>
-            <a:off x="1484311" y="2944368"/>
-            <a:ext cx="9927274" cy="2670048"/>
-          </a:xfrm>
-        </p:spPr>
+        <p:spPr/>
         <p:txBody>
           <a:bodyPr>
-            <a:noAutofit/>
+            <a:normAutofit fontScale="85000" lnSpcReduction="20000"/>
           </a:bodyPr>
           <a:lstStyle/>
           <a:p>
@@ -6600,15 +6729,15 @@
           <a:p>
             <a:pPr lvl="1"/>
             <a:r>
-              <a:rPr lang="en-US" dirty="0" smtClean="0"/>
+              <a:rPr lang="en-US" sz="2000" dirty="0" smtClean="0"/>
               <a:t>Terraform </a:t>
             </a:r>
             <a:r>
-              <a:rPr lang="en-US" dirty="0" err="1" smtClean="0"/>
+              <a:rPr lang="en-US" sz="2000" dirty="0" err="1" smtClean="0"/>
               <a:t>init</a:t>
             </a:r>
             <a:r>
-              <a:rPr lang="en-US" dirty="0" smtClean="0"/>
+              <a:rPr lang="en-US" sz="2000" dirty="0" smtClean="0"/>
               <a:t> – automatically download and install any provider binary in use with configuration. E.g. azure provider</a:t>
             </a:r>
           </a:p>
@@ -6621,30 +6750,30 @@
           <a:p>
             <a:pPr lvl="1"/>
             <a:r>
-              <a:rPr lang="en-US" dirty="0" smtClean="0"/>
+              <a:rPr lang="en-US" sz="2000" dirty="0" smtClean="0"/>
               <a:t>terraform plan - </a:t>
             </a:r>
             <a:r>
-              <a:rPr lang="en-US" dirty="0"/>
+              <a:rPr lang="en-US" sz="2000" dirty="0"/>
               <a:t>generate a report detailing what actions Terraform will take to set up your </a:t>
             </a:r>
             <a:r>
-              <a:rPr lang="en-US" dirty="0" smtClean="0"/>
+              <a:rPr lang="en-US" sz="2000" dirty="0" smtClean="0"/>
               <a:t>resources</a:t>
             </a:r>
           </a:p>
           <a:p>
             <a:pPr lvl="1"/>
             <a:r>
-              <a:rPr lang="en-US" dirty="0" smtClean="0"/>
+              <a:rPr lang="en-US" sz="2000" dirty="0" smtClean="0"/>
               <a:t>terraform apply - finish </a:t>
             </a:r>
             <a:r>
-              <a:rPr lang="en-US" dirty="0"/>
+              <a:rPr lang="en-US" sz="2000" dirty="0"/>
               <a:t>applying your </a:t>
             </a:r>
             <a:r>
-              <a:rPr lang="en-US" dirty="0" smtClean="0"/>
+              <a:rPr lang="en-US" sz="2000" dirty="0" smtClean="0"/>
               <a:t>configuration</a:t>
             </a:r>
           </a:p>
@@ -6657,34 +6786,34 @@
           <a:p>
             <a:pPr lvl="1"/>
             <a:r>
-              <a:rPr lang="en-US" dirty="0"/>
+              <a:rPr lang="en-US" sz="2000" dirty="0"/>
               <a:t>Terraform analyzes and applies your configuration, it creates an internal representation of the infrastructure it created and uses it to track the changes made. This state information is recorded in JSON in a local file named </a:t>
             </a:r>
             <a:r>
-              <a:rPr lang="en-US" dirty="0" err="1" smtClean="0"/>
+              <a:rPr lang="en-US" sz="2000" dirty="0" err="1" smtClean="0"/>
               <a:t>terraform.tfstate</a:t>
             </a:r>
             <a:r>
-              <a:rPr lang="en-US" dirty="0" smtClean="0"/>
+              <a:rPr lang="en-US" sz="2000" dirty="0" smtClean="0"/>
               <a:t>, </a:t>
             </a:r>
             <a:r>
-              <a:rPr lang="en-US" dirty="0"/>
+              <a:rPr lang="en-US" sz="2000" dirty="0"/>
               <a:t>but it can also be stored in </a:t>
             </a:r>
             <a:r>
-              <a:rPr lang="en-US" dirty="0" smtClean="0"/>
+              <a:rPr lang="en-US" sz="2000" dirty="0" smtClean="0"/>
               <a:t>other </a:t>
             </a:r>
             <a:r>
-              <a:rPr lang="en-US" dirty="0" smtClean="0"/>
-              <a:t>back ends</a:t>
-            </a:r>
-            <a:endParaRPr lang="en-US" dirty="0" smtClean="0"/>
+              <a:rPr lang="en-US" sz="2000" dirty="0" err="1" smtClean="0"/>
+              <a:t>backends</a:t>
+            </a:r>
+            <a:endParaRPr lang="en-US" sz="2000" dirty="0" smtClean="0"/>
           </a:p>
           <a:p>
             <a:pPr lvl="1"/>
-            <a:endParaRPr lang="en-US" dirty="0"/>
+            <a:endParaRPr lang="en-US" sz="2000" dirty="0"/>
           </a:p>
           <a:p>
             <a:endParaRPr lang="en-US" sz="2000" dirty="0"/>
@@ -6777,8 +6906,8 @@
           <a:p>
             <a:pPr lvl="1"/>
             <a:r>
-              <a:rPr lang="en-US" sz="2000" dirty="0" smtClean="0"/>
-              <a:t>Declare </a:t>
+              <a:rPr lang="en-US" sz="2000" dirty="0"/>
+              <a:t>You declare </a:t>
             </a:r>
             <a:r>
               <a:rPr lang="en-US" sz="2000" dirty="0" err="1"/>
@@ -6916,41 +7045,34 @@
             <p:ph idx="1"/>
           </p:nvPr>
         </p:nvSpPr>
-        <p:spPr>
-          <a:xfrm>
-            <a:off x="1484310" y="2438399"/>
-            <a:ext cx="10018713" cy="3124201"/>
-          </a:xfrm>
-        </p:spPr>
-        <p:txBody>
-          <a:bodyPr>
-            <a:normAutofit/>
-          </a:bodyPr>
+        <p:spPr/>
+        <p:txBody>
+          <a:bodyPr/>
           <a:lstStyle/>
           <a:p>
             <a:r>
-              <a:rPr lang="en-US" sz="2200" dirty="0" smtClean="0"/>
+              <a:rPr lang="en-US" dirty="0" smtClean="0"/>
               <a:t>Create an Azure Container Registry(ACR) Instance</a:t>
             </a:r>
           </a:p>
           <a:p>
             <a:r>
-              <a:rPr lang="en-US" sz="2200" dirty="0" smtClean="0"/>
+              <a:rPr lang="en-US" dirty="0" smtClean="0"/>
               <a:t>Tag a Container image for ACR</a:t>
             </a:r>
           </a:p>
           <a:p>
             <a:r>
-              <a:rPr lang="en-US" sz="2200" dirty="0" smtClean="0"/>
+              <a:rPr lang="en-US" dirty="0" smtClean="0"/>
               <a:t>Upload the image to ACR</a:t>
             </a:r>
           </a:p>
           <a:p>
             <a:r>
-              <a:rPr lang="en-US" sz="2200" dirty="0" smtClean="0"/>
+              <a:rPr lang="en-US" dirty="0" smtClean="0"/>
               <a:t>View images in your registry</a:t>
             </a:r>
-            <a:endParaRPr lang="en-US" sz="2200" dirty="0"/>
+            <a:endParaRPr lang="en-US" dirty="0"/>
           </a:p>
         </p:txBody>
       </p:sp>

</xml_diff>